<commit_message>
Lecture2 notes, homework, and Lecture1 update
</commit_message>
<xml_diff>
--- a/lecture1/Lecture_1.pptx
+++ b/lecture1/Lecture_1.pptx
@@ -4,6 +4,9 @@
   <p:sldMasterIdLst>
     <p:sldMasterId id="2147483648" r:id="rId1"/>
   </p:sldMasterIdLst>
+  <p:handoutMasterIdLst>
+    <p:handoutMasterId r:id="rId21"/>
+  </p:handoutMasterIdLst>
   <p:sldIdLst>
     <p:sldId id="256" r:id="rId2"/>
     <p:sldId id="257" r:id="rId3"/>
@@ -26,7 +29,7 @@
     <p:sldId id="276" r:id="rId20"/>
   </p:sldIdLst>
   <p:sldSz cx="12192000" cy="6858000"/>
-  <p:notesSz cx="6858000" cy="9144000"/>
+  <p:notesSz cx="7010400" cy="9296400"/>
   <p:defaultTextStyle>
     <a:defPPr>
       <a:defRPr lang="en-US"/>
@@ -140,6 +143,171 @@
     </p:extLst>
   </p:cmAuthor>
 </p:cmAuthorLst>
+</file>
+
+<file path=ppt/handoutMasters/handoutMaster1.xml><?xml version="1.0" encoding="utf-8"?>
+<p:handoutMaster xmlns:a="http://schemas.openxmlformats.org/drawingml/2006/main" xmlns:r="http://schemas.openxmlformats.org/officeDocument/2006/relationships" xmlns:p="http://schemas.openxmlformats.org/presentationml/2006/main">
+  <p:cSld>
+    <p:bg>
+      <p:bgRef idx="1001">
+        <a:schemeClr val="bg1"/>
+      </p:bgRef>
+    </p:bg>
+    <p:spTree>
+      <p:nvGrpSpPr>
+        <p:cNvPr id="1" name=""/>
+        <p:cNvGrpSpPr/>
+        <p:nvPr/>
+      </p:nvGrpSpPr>
+      <p:grpSpPr>
+        <a:xfrm>
+          <a:off x="0" y="0"/>
+          <a:ext cx="0" cy="0"/>
+          <a:chOff x="0" y="0"/>
+          <a:chExt cx="0" cy="0"/>
+        </a:xfrm>
+      </p:grpSpPr>
+      <p:sp>
+        <p:nvSpPr>
+          <p:cNvPr id="2" name="Header Placeholder 1"/>
+          <p:cNvSpPr>
+            <a:spLocks noGrp="1"/>
+          </p:cNvSpPr>
+          <p:nvPr>
+            <p:ph type="hdr" sz="quarter"/>
+          </p:nvPr>
+        </p:nvSpPr>
+        <p:spPr>
+          <a:xfrm>
+            <a:off x="1" y="0"/>
+            <a:ext cx="3038475" cy="466726"/>
+          </a:xfrm>
+          <a:prstGeom prst="rect">
+            <a:avLst/>
+          </a:prstGeom>
+        </p:spPr>
+        <p:txBody>
+          <a:bodyPr vert="horz" lIns="91440" tIns="45720" rIns="91440" bIns="45720" rtlCol="0"/>
+          <a:lstStyle>
+            <a:lvl1pPr algn="l">
+              <a:defRPr sz="1200"/>
+            </a:lvl1pPr>
+          </a:lstStyle>
+          <a:p>
+            <a:endParaRPr lang="en-US"/>
+          </a:p>
+        </p:txBody>
+      </p:sp>
+      <p:sp>
+        <p:nvSpPr>
+          <p:cNvPr id="3" name="Date Placeholder 2"/>
+          <p:cNvSpPr>
+            <a:spLocks noGrp="1"/>
+          </p:cNvSpPr>
+          <p:nvPr>
+            <p:ph type="dt" sz="quarter" idx="1"/>
+          </p:nvPr>
+        </p:nvSpPr>
+        <p:spPr>
+          <a:xfrm>
+            <a:off x="3970338" y="0"/>
+            <a:ext cx="3038475" cy="466726"/>
+          </a:xfrm>
+          <a:prstGeom prst="rect">
+            <a:avLst/>
+          </a:prstGeom>
+        </p:spPr>
+        <p:txBody>
+          <a:bodyPr vert="horz" lIns="91440" tIns="45720" rIns="91440" bIns="45720" rtlCol="0"/>
+          <a:lstStyle>
+            <a:lvl1pPr algn="r">
+              <a:defRPr sz="1200"/>
+            </a:lvl1pPr>
+          </a:lstStyle>
+          <a:p>
+            <a:fld id="{F2F28FD1-89DD-4677-B041-4B6F13BD2D30}" type="datetimeFigureOut">
+              <a:rPr lang="en-US" smtClean="0"/>
+              <a:t>1/12/2017</a:t>
+            </a:fld>
+            <a:endParaRPr lang="en-US"/>
+          </a:p>
+        </p:txBody>
+      </p:sp>
+      <p:sp>
+        <p:nvSpPr>
+          <p:cNvPr id="4" name="Footer Placeholder 3"/>
+          <p:cNvSpPr>
+            <a:spLocks noGrp="1"/>
+          </p:cNvSpPr>
+          <p:nvPr>
+            <p:ph type="ftr" sz="quarter" idx="2"/>
+          </p:nvPr>
+        </p:nvSpPr>
+        <p:spPr>
+          <a:xfrm>
+            <a:off x="1" y="8829676"/>
+            <a:ext cx="3038475" cy="466726"/>
+          </a:xfrm>
+          <a:prstGeom prst="rect">
+            <a:avLst/>
+          </a:prstGeom>
+        </p:spPr>
+        <p:txBody>
+          <a:bodyPr vert="horz" lIns="91440" tIns="45720" rIns="91440" bIns="45720" rtlCol="0" anchor="b"/>
+          <a:lstStyle>
+            <a:lvl1pPr algn="l">
+              <a:defRPr sz="1200"/>
+            </a:lvl1pPr>
+          </a:lstStyle>
+          <a:p>
+            <a:endParaRPr lang="en-US"/>
+          </a:p>
+        </p:txBody>
+      </p:sp>
+      <p:sp>
+        <p:nvSpPr>
+          <p:cNvPr id="5" name="Slide Number Placeholder 4"/>
+          <p:cNvSpPr>
+            <a:spLocks noGrp="1"/>
+          </p:cNvSpPr>
+          <p:nvPr>
+            <p:ph type="sldNum" sz="quarter" idx="3"/>
+          </p:nvPr>
+        </p:nvSpPr>
+        <p:spPr>
+          <a:xfrm>
+            <a:off x="3970338" y="8829676"/>
+            <a:ext cx="3038475" cy="466726"/>
+          </a:xfrm>
+          <a:prstGeom prst="rect">
+            <a:avLst/>
+          </a:prstGeom>
+        </p:spPr>
+        <p:txBody>
+          <a:bodyPr vert="horz" lIns="91440" tIns="45720" rIns="91440" bIns="45720" rtlCol="0" anchor="b"/>
+          <a:lstStyle>
+            <a:lvl1pPr algn="r">
+              <a:defRPr sz="1200"/>
+            </a:lvl1pPr>
+          </a:lstStyle>
+          <a:p>
+            <a:fld id="{508C7A12-BD53-48ED-A30B-9D87CB86F2A6}" type="slidenum">
+              <a:rPr lang="en-US" smtClean="0"/>
+              <a:t>‹#›</a:t>
+            </a:fld>
+            <a:endParaRPr lang="en-US"/>
+          </a:p>
+        </p:txBody>
+      </p:sp>
+    </p:spTree>
+    <p:extLst>
+      <p:ext uri="{BB962C8B-B14F-4D97-AF65-F5344CB8AC3E}">
+        <p14:creationId xmlns:p14="http://schemas.microsoft.com/office/powerpoint/2010/main" val="3261601211"/>
+      </p:ext>
+    </p:extLst>
+  </p:cSld>
+  <p:clrMap bg1="lt1" tx1="dk1" bg2="lt2" tx2="dk2" accent1="accent1" accent2="accent2" accent3="accent3" accent4="accent4" accent5="accent5" accent6="accent6" hlink="hlink" folHlink="folHlink"/>
+</p:handoutMaster>
 </file>
 
 <file path=ppt/slideLayouts/slideLayout1.xml><?xml version="1.0" encoding="utf-8"?>
@@ -3443,7 +3611,6 @@
               <a:rPr lang="en-US" dirty="0" smtClean="0"/>
               <a:t>power</a:t>
             </a:r>
-            <a:endParaRPr lang="en-US" dirty="0" smtClean="0"/>
           </a:p>
         </p:txBody>
       </p:sp>
@@ -3551,11 +3718,7 @@
             </a:r>
             <a:r>
               <a:rPr lang="en-US" dirty="0" smtClean="0"/>
-              <a:t> operators</a:t>
-            </a:r>
-            <a:r>
-              <a:rPr lang="en-US" dirty="0" smtClean="0"/>
-              <a:t>. It is best practice to </a:t>
+              <a:t> operators. It is best practice to </a:t>
             </a:r>
             <a:r>
               <a:rPr lang="en-US" dirty="0"/>
@@ -3576,7 +3739,6 @@
               <a:rPr lang="en-US" dirty="0" smtClean="0"/>
               <a:t>.</a:t>
             </a:r>
-            <a:endParaRPr lang="en-US" dirty="0" smtClean="0"/>
           </a:p>
           <a:p>
             <a:r>
@@ -6149,4 +6311,736 @@
     </a:ext>
   </a:extLst>
 </a:theme>
+</file>
+
+<file path=ppt/theme/theme2.xml><?xml version="1.0" encoding="utf-8"?>
+<a:theme xmlns:a="http://schemas.openxmlformats.org/drawingml/2006/main" name="Office Theme">
+  <a:themeElements>
+    <a:clrScheme name="Office">
+      <a:dk1>
+        <a:sysClr val="windowText" lastClr="000000"/>
+      </a:dk1>
+      <a:lt1>
+        <a:sysClr val="window" lastClr="FFFFFF"/>
+      </a:lt1>
+      <a:dk2>
+        <a:srgbClr val="44546A"/>
+      </a:dk2>
+      <a:lt2>
+        <a:srgbClr val="E7E6E6"/>
+      </a:lt2>
+      <a:accent1>
+        <a:srgbClr val="5B9BD5"/>
+      </a:accent1>
+      <a:accent2>
+        <a:srgbClr val="ED7D31"/>
+      </a:accent2>
+      <a:accent3>
+        <a:srgbClr val="A5A5A5"/>
+      </a:accent3>
+      <a:accent4>
+        <a:srgbClr val="FFC000"/>
+      </a:accent4>
+      <a:accent5>
+        <a:srgbClr val="4472C4"/>
+      </a:accent5>
+      <a:accent6>
+        <a:srgbClr val="70AD47"/>
+      </a:accent6>
+      <a:hlink>
+        <a:srgbClr val="0563C1"/>
+      </a:hlink>
+      <a:folHlink>
+        <a:srgbClr val="954F72"/>
+      </a:folHlink>
+    </a:clrScheme>
+    <a:fontScheme name="Office">
+      <a:majorFont>
+        <a:latin typeface="Calibri Light" panose="020F0302020204030204"/>
+        <a:ea typeface=""/>
+        <a:cs typeface=""/>
+        <a:font script="Jpan" typeface="ＭＳ Ｐゴシック"/>
+        <a:font script="Hang" typeface="맑은 고딕"/>
+        <a:font script="Hans" typeface="宋体"/>
+        <a:font script="Hant" typeface="新細明體"/>
+        <a:font script="Arab" typeface="Times New Roman"/>
+        <a:font script="Hebr" typeface="Times New Roman"/>
+        <a:font script="Thai" typeface="Angsana New"/>
+        <a:font script="Ethi" typeface="Nyala"/>
+        <a:font script="Beng" typeface="Vrinda"/>
+        <a:font script="Gujr" typeface="Shruti"/>
+        <a:font script="Khmr" typeface="MoolBoran"/>
+        <a:font script="Knda" typeface="Tunga"/>
+        <a:font script="Guru" typeface="Raavi"/>
+        <a:font script="Cans" typeface="Euphemia"/>
+        <a:font script="Cher" typeface="Plantagenet Cherokee"/>
+        <a:font script="Yiii" typeface="Microsoft Yi Baiti"/>
+        <a:font script="Tibt" typeface="Microsoft Himalaya"/>
+        <a:font script="Thaa" typeface="MV Boli"/>
+        <a:font script="Deva" typeface="Mangal"/>
+        <a:font script="Telu" typeface="Gautami"/>
+        <a:font script="Taml" typeface="Latha"/>
+        <a:font script="Syrc" typeface="Estrangelo Edessa"/>
+        <a:font script="Orya" typeface="Kalinga"/>
+        <a:font script="Mlym" typeface="Kartika"/>
+        <a:font script="Laoo" typeface="DokChampa"/>
+        <a:font script="Sinh" typeface="Iskoola Pota"/>
+        <a:font script="Mong" typeface="Mongolian Baiti"/>
+        <a:font script="Viet" typeface="Times New Roman"/>
+        <a:font script="Uigh" typeface="Microsoft Uighur"/>
+        <a:font script="Geor" typeface="Sylfaen"/>
+      </a:majorFont>
+      <a:minorFont>
+        <a:latin typeface="Calibri" panose="020F0502020204030204"/>
+        <a:ea typeface=""/>
+        <a:cs typeface=""/>
+        <a:font script="Jpan" typeface="ＭＳ Ｐゴシック"/>
+        <a:font script="Hang" typeface="맑은 고딕"/>
+        <a:font script="Hans" typeface="宋体"/>
+        <a:font script="Hant" typeface="新細明體"/>
+        <a:font script="Arab" typeface="Arial"/>
+        <a:font script="Hebr" typeface="Arial"/>
+        <a:font script="Thai" typeface="Cordia New"/>
+        <a:font script="Ethi" typeface="Nyala"/>
+        <a:font script="Beng" typeface="Vrinda"/>
+        <a:font script="Gujr" typeface="Shruti"/>
+        <a:font script="Khmr" typeface="DaunPenh"/>
+        <a:font script="Knda" typeface="Tunga"/>
+        <a:font script="Guru" typeface="Raavi"/>
+        <a:font script="Cans" typeface="Euphemia"/>
+        <a:font script="Cher" typeface="Plantagenet Cherokee"/>
+        <a:font script="Yiii" typeface="Microsoft Yi Baiti"/>
+        <a:font script="Tibt" typeface="Microsoft Himalaya"/>
+        <a:font script="Thaa" typeface="MV Boli"/>
+        <a:font script="Deva" typeface="Mangal"/>
+        <a:font script="Telu" typeface="Gautami"/>
+        <a:font script="Taml" typeface="Latha"/>
+        <a:font script="Syrc" typeface="Estrangelo Edessa"/>
+        <a:font script="Orya" typeface="Kalinga"/>
+        <a:font script="Mlym" typeface="Kartika"/>
+        <a:font script="Laoo" typeface="DokChampa"/>
+        <a:font script="Sinh" typeface="Iskoola Pota"/>
+        <a:font script="Mong" typeface="Mongolian Baiti"/>
+        <a:font script="Viet" typeface="Arial"/>
+        <a:font script="Uigh" typeface="Microsoft Uighur"/>
+        <a:font script="Geor" typeface="Sylfaen"/>
+      </a:minorFont>
+    </a:fontScheme>
+    <a:fmtScheme name="Office">
+      <a:fillStyleLst>
+        <a:solidFill>
+          <a:schemeClr val="phClr"/>
+        </a:solidFill>
+        <a:gradFill rotWithShape="1">
+          <a:gsLst>
+            <a:gs pos="0">
+              <a:schemeClr val="phClr">
+                <a:lumMod val="110000"/>
+                <a:satMod val="105000"/>
+                <a:tint val="67000"/>
+              </a:schemeClr>
+            </a:gs>
+            <a:gs pos="50000">
+              <a:schemeClr val="phClr">
+                <a:lumMod val="105000"/>
+                <a:satMod val="103000"/>
+                <a:tint val="73000"/>
+              </a:schemeClr>
+            </a:gs>
+            <a:gs pos="100000">
+              <a:schemeClr val="phClr">
+                <a:lumMod val="105000"/>
+                <a:satMod val="109000"/>
+                <a:tint val="81000"/>
+              </a:schemeClr>
+            </a:gs>
+          </a:gsLst>
+          <a:lin ang="5400000" scaled="0"/>
+        </a:gradFill>
+        <a:gradFill rotWithShape="1">
+          <a:gsLst>
+            <a:gs pos="0">
+              <a:schemeClr val="phClr">
+                <a:satMod val="103000"/>
+                <a:lumMod val="102000"/>
+                <a:tint val="94000"/>
+              </a:schemeClr>
+            </a:gs>
+            <a:gs pos="50000">
+              <a:schemeClr val="phClr">
+                <a:satMod val="110000"/>
+                <a:lumMod val="100000"/>
+                <a:shade val="100000"/>
+              </a:schemeClr>
+            </a:gs>
+            <a:gs pos="100000">
+              <a:schemeClr val="phClr">
+                <a:lumMod val="99000"/>
+                <a:satMod val="120000"/>
+                <a:shade val="78000"/>
+              </a:schemeClr>
+            </a:gs>
+          </a:gsLst>
+          <a:lin ang="5400000" scaled="0"/>
+        </a:gradFill>
+      </a:fillStyleLst>
+      <a:lnStyleLst>
+        <a:ln w="6350" cap="flat" cmpd="sng" algn="ctr">
+          <a:solidFill>
+            <a:schemeClr val="phClr"/>
+          </a:solidFill>
+          <a:prstDash val="solid"/>
+          <a:miter lim="800000"/>
+        </a:ln>
+        <a:ln w="12700" cap="flat" cmpd="sng" algn="ctr">
+          <a:solidFill>
+            <a:schemeClr val="phClr"/>
+          </a:solidFill>
+          <a:prstDash val="solid"/>
+          <a:miter lim="800000"/>
+        </a:ln>
+        <a:ln w="19050" cap="flat" cmpd="sng" algn="ctr">
+          <a:solidFill>
+            <a:schemeClr val="phClr"/>
+          </a:solidFill>
+          <a:prstDash val="solid"/>
+          <a:miter lim="800000"/>
+        </a:ln>
+      </a:lnStyleLst>
+      <a:effectStyleLst>
+        <a:effectStyle>
+          <a:effectLst/>
+        </a:effectStyle>
+        <a:effectStyle>
+          <a:effectLst/>
+        </a:effectStyle>
+        <a:effectStyle>
+          <a:effectLst>
+            <a:outerShdw blurRad="57150" dist="19050" dir="5400000" algn="ctr" rotWithShape="0">
+              <a:srgbClr val="000000">
+                <a:alpha val="63000"/>
+              </a:srgbClr>
+            </a:outerShdw>
+          </a:effectLst>
+        </a:effectStyle>
+      </a:effectStyleLst>
+      <a:bgFillStyleLst>
+        <a:solidFill>
+          <a:schemeClr val="phClr"/>
+        </a:solidFill>
+        <a:solidFill>
+          <a:schemeClr val="phClr">
+            <a:tint val="95000"/>
+            <a:satMod val="170000"/>
+          </a:schemeClr>
+        </a:solidFill>
+        <a:gradFill rotWithShape="1">
+          <a:gsLst>
+            <a:gs pos="0">
+              <a:schemeClr val="phClr">
+                <a:tint val="93000"/>
+                <a:satMod val="150000"/>
+                <a:shade val="98000"/>
+                <a:lumMod val="102000"/>
+              </a:schemeClr>
+            </a:gs>
+            <a:gs pos="50000">
+              <a:schemeClr val="phClr">
+                <a:tint val="98000"/>
+                <a:satMod val="130000"/>
+                <a:shade val="90000"/>
+                <a:lumMod val="103000"/>
+              </a:schemeClr>
+            </a:gs>
+            <a:gs pos="100000">
+              <a:schemeClr val="phClr">
+                <a:shade val="63000"/>
+                <a:satMod val="120000"/>
+              </a:schemeClr>
+            </a:gs>
+          </a:gsLst>
+          <a:lin ang="5400000" scaled="0"/>
+        </a:gradFill>
+      </a:bgFillStyleLst>
+    </a:fmtScheme>
+  </a:themeElements>
+  <a:objectDefaults/>
+  <a:extraClrSchemeLst/>
+  <a:extLst>
+    <a:ext uri="{05A4C25C-085E-4340-85A3-A5531E510DB2}">
+      <thm15:themeFamily xmlns:thm15="http://schemas.microsoft.com/office/thememl/2012/main" name="Office Theme" id="{62F939B6-93AF-4DB8-9C6B-D6C7DFDC589F}" vid="{4A3C46E8-61CC-4603-A589-7422A47A8E4A}"/>
+    </a:ext>
+  </a:extLst>
+</a:theme>
+</file>
+
+<file path=customXml/item1.xml><?xml version="1.0" encoding="utf-8"?>
+<ct:contentTypeSchema xmlns:ct="http://schemas.microsoft.com/office/2006/metadata/contentType" xmlns:ma="http://schemas.microsoft.com/office/2006/metadata/properties/metaAttributes" ct:_="" ma:_="" ma:contentTypeName="Document" ma:contentTypeID="0x0101002BE17A8BB07CA6459B68986233AF7C0B" ma:contentTypeVersion="72" ma:contentTypeDescription="Create a new document." ma:contentTypeScope="" ma:versionID="6fcce7e26b6ce38abc43126aed1da0ad">
+  <xsd:schema xmlns:xsd="http://www.w3.org/2001/XMLSchema" xmlns:xs="http://www.w3.org/2001/XMLSchema" xmlns:p="http://schemas.microsoft.com/office/2006/metadata/properties" xmlns:ns1="http://schemas.microsoft.com/sharepoint/v3" xmlns:ns2="1ceb290c-0c0f-4d75-9d55-bf954c0fe360" xmlns:ns4="http://schemas.microsoft.com/sharepoint/v4" targetNamespace="http://schemas.microsoft.com/office/2006/metadata/properties" ma:root="true" ma:fieldsID="bb791570516f0e3cdbf12b15736ec310" ns1:_="" ns2:_="" ns4:_="">
+    <xsd:import namespace="http://schemas.microsoft.com/sharepoint/v3"/>
+    <xsd:import namespace="1ceb290c-0c0f-4d75-9d55-bf954c0fe360"/>
+    <xsd:import namespace="http://schemas.microsoft.com/sharepoint/v4"/>
+    <xsd:element name="properties">
+      <xsd:complexType>
+        <xsd:sequence>
+          <xsd:element name="documentManagement">
+            <xsd:complexType>
+              <xsd:all>
+                <xsd:element ref="ns2:Project_x0020_Owner" minOccurs="0"/>
+                <xsd:element ref="ns2:Authors" minOccurs="0"/>
+                <xsd:element ref="ns2:Security" minOccurs="0"/>
+                <xsd:element ref="ns1:PublishingStartDate" minOccurs="0"/>
+                <xsd:element ref="ns1:PublishingExpirationDate" minOccurs="0"/>
+                <xsd:element ref="ns2:_dlc_DocId" minOccurs="0"/>
+                <xsd:element ref="ns2:_dlc_DocIdUrl" minOccurs="0"/>
+                <xsd:element ref="ns2:_dlc_DocIdPersistId" minOccurs="0"/>
+                <xsd:element ref="ns2:Section" minOccurs="0"/>
+                <xsd:element ref="ns2:Division" minOccurs="0"/>
+                <xsd:element ref="ns4:IconOverlay" minOccurs="0"/>
+                <xsd:element ref="ns1:_vti_ItemDeclaredRecord" minOccurs="0"/>
+                <xsd:element ref="ns1:_vti_ItemHoldRecordStatus" minOccurs="0"/>
+                <xsd:element ref="ns2:Readers" minOccurs="0"/>
+              </xsd:all>
+            </xsd:complexType>
+          </xsd:element>
+        </xsd:sequence>
+      </xsd:complexType>
+    </xsd:element>
+  </xsd:schema>
+  <xsd:schema xmlns:xsd="http://www.w3.org/2001/XMLSchema" xmlns:xs="http://www.w3.org/2001/XMLSchema" xmlns:dms="http://schemas.microsoft.com/office/2006/documentManagement/types" xmlns:pc="http://schemas.microsoft.com/office/infopath/2007/PartnerControls" targetNamespace="http://schemas.microsoft.com/sharepoint/v3" elementFormDefault="qualified">
+    <xsd:import namespace="http://schemas.microsoft.com/office/2006/documentManagement/types"/>
+    <xsd:import namespace="http://schemas.microsoft.com/office/infopath/2007/PartnerControls"/>
+    <xsd:element name="PublishingStartDate" ma:index="7" nillable="true" ma:displayName="Scheduling Start Date" ma:description="Scheduling Start Date is a site column created by the Publishing feature. It is used to specify the date and time on which this page will first appear to site visitors." ma:hidden="true" ma:internalName="PublishingStartDate">
+      <xsd:simpleType>
+        <xsd:restriction base="dms:Unknown"/>
+      </xsd:simpleType>
+    </xsd:element>
+    <xsd:element name="PublishingExpirationDate" ma:index="8" nillable="true" ma:displayName="Scheduling End Date" ma:description="Scheduling End Date is a site column created by the Publishing feature. It is used to specify the date and time on which this page will no longer appear to site visitors." ma:hidden="true" ma:internalName="PublishingExpirationDate">
+      <xsd:simpleType>
+        <xsd:restriction base="dms:Unknown"/>
+      </xsd:simpleType>
+    </xsd:element>
+    <xsd:element name="_vti_ItemDeclaredRecord" ma:index="17" nillable="true" ma:displayName="Declared Record" ma:hidden="true" ma:internalName="_vti_ItemDeclaredRecord" ma:readOnly="true">
+      <xsd:simpleType>
+        <xsd:restriction base="dms:DateTime"/>
+      </xsd:simpleType>
+    </xsd:element>
+    <xsd:element name="_vti_ItemHoldRecordStatus" ma:index="18" nillable="true" ma:displayName="Hold and Record Status" ma:decimals="0" ma:hidden="true" ma:internalName="_vti_ItemHoldRecordStatus" ma:readOnly="true">
+      <xsd:simpleType>
+        <xsd:restriction base="dms:Unknown"/>
+      </xsd:simpleType>
+    </xsd:element>
+  </xsd:schema>
+  <xsd:schema xmlns:xsd="http://www.w3.org/2001/XMLSchema" xmlns:xs="http://www.w3.org/2001/XMLSchema" xmlns:dms="http://schemas.microsoft.com/office/2006/documentManagement/types" xmlns:pc="http://schemas.microsoft.com/office/infopath/2007/PartnerControls" targetNamespace="1ceb290c-0c0f-4d75-9d55-bf954c0fe360" elementFormDefault="qualified">
+    <xsd:import namespace="http://schemas.microsoft.com/office/2006/documentManagement/types"/>
+    <xsd:import namespace="http://schemas.microsoft.com/office/infopath/2007/PartnerControls"/>
+    <xsd:element name="Project_x0020_Owner" ma:index="2" nillable="true" ma:displayName="Project Owner" ma:description="Only one" ma:hidden="true" ma:list="UserInfo" ma:SharePointGroup="0" ma:internalName="Project_x0020_Owner" ma:readOnly="false" ma:showField="ImnName">
+      <xsd:complexType>
+        <xsd:complexContent>
+          <xsd:extension base="dms:User">
+            <xsd:sequence>
+              <xsd:element name="UserInfo" minOccurs="0" maxOccurs="unbounded">
+                <xsd:complexType>
+                  <xsd:sequence>
+                    <xsd:element name="DisplayName" type="xsd:string" minOccurs="0"/>
+                    <xsd:element name="AccountId" type="dms:UserId" minOccurs="0" nillable="true"/>
+                    <xsd:element name="AccountType" type="xsd:string" minOccurs="0"/>
+                  </xsd:sequence>
+                </xsd:complexType>
+              </xsd:element>
+            </xsd:sequence>
+          </xsd:extension>
+        </xsd:complexContent>
+      </xsd:complexType>
+    </xsd:element>
+    <xsd:element name="Authors" ma:index="3" nillable="true" ma:displayName="Authors" ma:description="To add SharePoint security groups start typing &quot;m2-arcd-s-GROUP NAME&quot;" ma:hidden="true" ma:list="UserInfo" ma:SearchPeopleOnly="false" ma:SharePointGroup="0" ma:internalName="Authors" ma:readOnly="false" ma:showField="ImnName">
+      <xsd:complexType>
+        <xsd:complexContent>
+          <xsd:extension base="dms:UserMulti">
+            <xsd:sequence>
+              <xsd:element name="UserInfo" minOccurs="0" maxOccurs="unbounded">
+                <xsd:complexType>
+                  <xsd:sequence>
+                    <xsd:element name="DisplayName" type="xsd:string" minOccurs="0"/>
+                    <xsd:element name="AccountId" type="dms:UserId" minOccurs="0" nillable="true"/>
+                    <xsd:element name="AccountType" type="xsd:string" minOccurs="0"/>
+                  </xsd:sequence>
+                </xsd:complexType>
+              </xsd:element>
+            </xsd:sequence>
+          </xsd:extension>
+        </xsd:complexContent>
+      </xsd:complexType>
+    </xsd:element>
+    <xsd:element name="Security" ma:index="4" nillable="true" ma:displayName="Security" ma:default="Internal FR" ma:description="" ma:format="Dropdown" ma:internalName="Security" ma:readOnly="false">
+      <xsd:simpleType>
+        <xsd:restriction base="dms:Choice">
+          <xsd:enumeration value="FOMC I"/>
+          <xsd:enumeration value="FOMC II"/>
+          <xsd:enumeration value="FOMC III"/>
+          <xsd:enumeration value="Internal FR"/>
+          <xsd:enumeration value="Restricted FR"/>
+          <xsd:enumeration value="Restricted Controlled FR"/>
+        </xsd:restriction>
+      </xsd:simpleType>
+    </xsd:element>
+    <xsd:element name="_dlc_DocId" ma:index="9" nillable="true" ma:displayName="Document ID Value" ma:description="The value of the document ID assigned to this item." ma:internalName="_dlc_DocId" ma:readOnly="true">
+      <xsd:simpleType>
+        <xsd:restriction base="dms:Text"/>
+      </xsd:simpleType>
+    </xsd:element>
+    <xsd:element name="_dlc_DocIdUrl" ma:index="10" nillable="true" ma:displayName="Document ID" ma:description="Permanent link to this document." ma:hidden="true" ma:internalName="_dlc_DocIdUrl" ma:readOnly="true">
+      <xsd:complexType>
+        <xsd:complexContent>
+          <xsd:extension base="dms:URL">
+            <xsd:sequence>
+              <xsd:element name="Url" type="dms:ValidUrl" minOccurs="0" nillable="true"/>
+              <xsd:element name="Description" type="xsd:string" nillable="true"/>
+            </xsd:sequence>
+          </xsd:extension>
+        </xsd:complexContent>
+      </xsd:complexType>
+    </xsd:element>
+    <xsd:element name="_dlc_DocIdPersistId" ma:index="11" nillable="true" ma:displayName="Persist ID" ma:description="Keep ID on add." ma:hidden="true" ma:internalName="_dlc_DocIdPersistId" ma:readOnly="true">
+      <xsd:simpleType>
+        <xsd:restriction base="dms:Boolean"/>
+      </xsd:simpleType>
+    </xsd:element>
+    <xsd:element name="Section" ma:index="14" nillable="true" ma:displayName="Section" ma:hidden="true" ma:internalName="Section" ma:readOnly="false">
+      <xsd:simpleType>
+        <xsd:restriction base="dms:Text"/>
+      </xsd:simpleType>
+    </xsd:element>
+    <xsd:element name="Division" ma:index="15" nillable="true" ma:displayName="Division" ma:hidden="true" ma:internalName="Division" ma:readOnly="false">
+      <xsd:simpleType>
+        <xsd:restriction base="dms:Text">
+          <xsd:maxLength value="255"/>
+        </xsd:restriction>
+      </xsd:simpleType>
+    </xsd:element>
+    <xsd:element name="Readers" ma:index="23" nillable="true" ma:displayName="Readers" ma:description="(Optional)&#10;&#10;To add SharePoint security groups start typing &quot;m2-arcd-s-GROUP NAME&quot;" ma:hidden="true" ma:list="UserInfo" ma:SearchPeopleOnly="false" ma:SharePointGroup="0" ma:internalName="Readers" ma:readOnly="false" ma:showField="Title">
+      <xsd:complexType>
+        <xsd:complexContent>
+          <xsd:extension base="dms:UserMulti">
+            <xsd:sequence>
+              <xsd:element name="UserInfo" minOccurs="0" maxOccurs="unbounded">
+                <xsd:complexType>
+                  <xsd:sequence>
+                    <xsd:element name="DisplayName" type="xsd:string" minOccurs="0"/>
+                    <xsd:element name="AccountId" type="dms:UserId" minOccurs="0" nillable="true"/>
+                    <xsd:element name="AccountType" type="xsd:string" minOccurs="0"/>
+                  </xsd:sequence>
+                </xsd:complexType>
+              </xsd:element>
+            </xsd:sequence>
+          </xsd:extension>
+        </xsd:complexContent>
+      </xsd:complexType>
+    </xsd:element>
+  </xsd:schema>
+  <xsd:schema xmlns:xsd="http://www.w3.org/2001/XMLSchema" xmlns:xs="http://www.w3.org/2001/XMLSchema" xmlns:dms="http://schemas.microsoft.com/office/2006/documentManagement/types" xmlns:pc="http://schemas.microsoft.com/office/infopath/2007/PartnerControls" targetNamespace="http://schemas.microsoft.com/sharepoint/v4" elementFormDefault="qualified">
+    <xsd:import namespace="http://schemas.microsoft.com/office/2006/documentManagement/types"/>
+    <xsd:import namespace="http://schemas.microsoft.com/office/infopath/2007/PartnerControls"/>
+    <xsd:element name="IconOverlay" ma:index="16" nillable="true" ma:displayName="IconOverlay" ma:hidden="true" ma:internalName="IconOverlay">
+      <xsd:simpleType>
+        <xsd:restriction base="dms:Text"/>
+      </xsd:simpleType>
+    </xsd:element>
+  </xsd:schema>
+  <xsd:schema xmlns="http://schemas.openxmlformats.org/package/2006/metadata/core-properties" xmlns:xsd="http://www.w3.org/2001/XMLSchema" xmlns:xsi="http://www.w3.org/2001/XMLSchema-instance" xmlns:dc="http://purl.org/dc/elements/1.1/" xmlns:dcterms="http://purl.org/dc/terms/" xmlns:odoc="http://schemas.microsoft.com/internal/obd" targetNamespace="http://schemas.openxmlformats.org/package/2006/metadata/core-properties" elementFormDefault="qualified" attributeFormDefault="unqualified" blockDefault="#all">
+    <xsd:import namespace="http://purl.org/dc/elements/1.1/" schemaLocation="http://dublincore.org/schemas/xmls/qdc/2003/04/02/dc.xsd"/>
+    <xsd:import namespace="http://purl.org/dc/terms/" schemaLocation="http://dublincore.org/schemas/xmls/qdc/2003/04/02/dcterms.xsd"/>
+    <xsd:element name="coreProperties" type="CT_coreProperties"/>
+    <xsd:complexType name="CT_coreProperties">
+      <xsd:all>
+        <xsd:element ref="dc:creator" minOccurs="0" maxOccurs="1"/>
+        <xsd:element ref="dcterms:created" minOccurs="0" maxOccurs="1"/>
+        <xsd:element ref="dc:identifier" minOccurs="0" maxOccurs="1"/>
+        <xsd:element name="contentType" minOccurs="0" maxOccurs="1" type="xsd:string" ma:index="22" ma:displayName="Content Type"/>
+        <xsd:element ref="dc:title" minOccurs="0" maxOccurs="1" ma:index="1" ma:displayName="Title"/>
+        <xsd:element ref="dc:subject" minOccurs="0" maxOccurs="1"/>
+        <xsd:element ref="dc:description" minOccurs="0" maxOccurs="1"/>
+        <xsd:element name="keywords" minOccurs="0" maxOccurs="1" type="xsd:string"/>
+        <xsd:element ref="dc:language" minOccurs="0" maxOccurs="1"/>
+        <xsd:element name="category" minOccurs="0" maxOccurs="1" type="xsd:string"/>
+        <xsd:element name="version" minOccurs="0" maxOccurs="1" type="xsd:string"/>
+        <xsd:element name="revision" minOccurs="0" maxOccurs="1" type="xsd:string">
+          <xsd:annotation>
+            <xsd:documentation>
+                        This value indicates the number of saves or revisions. The application is responsible for updating this value after each revision.
+                    </xsd:documentation>
+          </xsd:annotation>
+        </xsd:element>
+        <xsd:element name="lastModifiedBy" minOccurs="0" maxOccurs="1" type="xsd:string"/>
+        <xsd:element ref="dcterms:modified" minOccurs="0" maxOccurs="1"/>
+        <xsd:element name="contentStatus" minOccurs="0" maxOccurs="1" type="xsd:string"/>
+      </xsd:all>
+    </xsd:complexType>
+  </xsd:schema>
+  <xs:schema xmlns:pc="http://schemas.microsoft.com/office/infopath/2007/PartnerControls" xmlns:xs="http://www.w3.org/2001/XMLSchema" targetNamespace="http://schemas.microsoft.com/office/infopath/2007/PartnerControls" elementFormDefault="qualified" attributeFormDefault="unqualified">
+    <xs:element name="Person">
+      <xs:complexType>
+        <xs:sequence>
+          <xs:element ref="pc:DisplayName" minOccurs="0"/>
+          <xs:element ref="pc:AccountId" minOccurs="0"/>
+          <xs:element ref="pc:AccountType" minOccurs="0"/>
+        </xs:sequence>
+      </xs:complexType>
+    </xs:element>
+    <xs:element name="DisplayName" type="xs:string"/>
+    <xs:element name="AccountId" type="xs:string"/>
+    <xs:element name="AccountType" type="xs:string"/>
+    <xs:element name="BDCAssociatedEntity">
+      <xs:complexType>
+        <xs:sequence>
+          <xs:element ref="pc:BDCEntity" minOccurs="0" maxOccurs="unbounded"/>
+        </xs:sequence>
+        <xs:attribute ref="pc:EntityNamespace"/>
+        <xs:attribute ref="pc:EntityName"/>
+        <xs:attribute ref="pc:SystemInstanceName"/>
+        <xs:attribute ref="pc:AssociationName"/>
+      </xs:complexType>
+    </xs:element>
+    <xs:attribute name="EntityNamespace" type="xs:string"/>
+    <xs:attribute name="EntityName" type="xs:string"/>
+    <xs:attribute name="SystemInstanceName" type="xs:string"/>
+    <xs:attribute name="AssociationName" type="xs:string"/>
+    <xs:element name="BDCEntity">
+      <xs:complexType>
+        <xs:sequence>
+          <xs:element ref="pc:EntityDisplayName" minOccurs="0"/>
+          <xs:element ref="pc:EntityInstanceReference" minOccurs="0"/>
+          <xs:element ref="pc:EntityId1" minOccurs="0"/>
+          <xs:element ref="pc:EntityId2" minOccurs="0"/>
+          <xs:element ref="pc:EntityId3" minOccurs="0"/>
+          <xs:element ref="pc:EntityId4" minOccurs="0"/>
+          <xs:element ref="pc:EntityId5" minOccurs="0"/>
+        </xs:sequence>
+      </xs:complexType>
+    </xs:element>
+    <xs:element name="EntityDisplayName" type="xs:string"/>
+    <xs:element name="EntityInstanceReference" type="xs:string"/>
+    <xs:element name="EntityId1" type="xs:string"/>
+    <xs:element name="EntityId2" type="xs:string"/>
+    <xs:element name="EntityId3" type="xs:string"/>
+    <xs:element name="EntityId4" type="xs:string"/>
+    <xs:element name="EntityId5" type="xs:string"/>
+    <xs:element name="Terms">
+      <xs:complexType>
+        <xs:sequence>
+          <xs:element ref="pc:TermInfo" minOccurs="0" maxOccurs="unbounded"/>
+        </xs:sequence>
+      </xs:complexType>
+    </xs:element>
+    <xs:element name="TermInfo">
+      <xs:complexType>
+        <xs:sequence>
+          <xs:element ref="pc:TermName" minOccurs="0"/>
+          <xs:element ref="pc:TermId" minOccurs="0"/>
+        </xs:sequence>
+      </xs:complexType>
+    </xs:element>
+    <xs:element name="TermName" type="xs:string"/>
+    <xs:element name="TermId" type="xs:string"/>
+  </xs:schema>
+</ct:contentTypeSchema>
+</file>
+
+<file path=customXml/item2.xml><?xml version="1.0" encoding="utf-8"?>
+<?mso-contentType ?>
+<spe:Receivers xmlns:spe="http://schemas.microsoft.com/sharepoint/events">
+  <Receiver>
+    <Name>Document ID Generator</Name>
+    <Synchronization>Synchronous</Synchronization>
+    <Type>10001</Type>
+    <SequenceNumber>1000</SequenceNumber>
+    <Url/>
+    <Assembly>Microsoft.Office.DocumentManagement, Version=15.0.0.0, Culture=neutral, PublicKeyToken=71e9bce111e9429c</Assembly>
+    <Class>Microsoft.Office.DocumentManagement.Internal.DocIdHandler</Class>
+    <Data/>
+    <Filter/>
+  </Receiver>
+  <Receiver>
+    <Name>Document ID Generator</Name>
+    <Synchronization>Synchronous</Synchronization>
+    <Type>10002</Type>
+    <SequenceNumber>1001</SequenceNumber>
+    <Url/>
+    <Assembly>Microsoft.Office.DocumentManagement, Version=15.0.0.0, Culture=neutral, PublicKeyToken=71e9bce111e9429c</Assembly>
+    <Class>Microsoft.Office.DocumentManagement.Internal.DocIdHandler</Class>
+    <Data/>
+    <Filter/>
+  </Receiver>
+  <Receiver>
+    <Name>Document ID Generator</Name>
+    <Synchronization>Synchronous</Synchronization>
+    <Type>10004</Type>
+    <SequenceNumber>1002</SequenceNumber>
+    <Url/>
+    <Assembly>Microsoft.Office.DocumentManagement, Version=15.0.0.0, Culture=neutral, PublicKeyToken=71e9bce111e9429c</Assembly>
+    <Class>Microsoft.Office.DocumentManagement.Internal.DocIdHandler</Class>
+    <Data/>
+    <Filter/>
+  </Receiver>
+  <Receiver>
+    <Name>Document ID Generator</Name>
+    <Synchronization>Synchronous</Synchronization>
+    <Type>10006</Type>
+    <SequenceNumber>1003</SequenceNumber>
+    <Url/>
+    <Assembly>Microsoft.Office.DocumentManagement, Version=15.0.0.0, Culture=neutral, PublicKeyToken=71e9bce111e9429c</Assembly>
+    <Class>Microsoft.Office.DocumentManagement.Internal.DocIdHandler</Class>
+    <Data/>
+    <Filter/>
+  </Receiver>
+</spe:Receivers>
+</file>
+
+<file path=customXml/item3.xml><?xml version="1.0" encoding="utf-8"?>
+<?mso-contentType ?>
+<FormTemplates xmlns="http://schemas.microsoft.com/sharepoint/v3/contenttype/forms">
+  <Display>DocumentLibraryForm</Display>
+  <Edit>DocumentLibraryForm</Edit>
+  <New>DocumentLibraryForm</New>
+</FormTemplates>
+</file>
+
+<file path=customXml/item4.xml><?xml version="1.0" encoding="utf-8"?>
+<p:properties xmlns:p="http://schemas.microsoft.com/office/2006/metadata/properties" xmlns:xsi="http://www.w3.org/2001/XMLSchema-instance" xmlns:pc="http://schemas.microsoft.com/office/infopath/2007/PartnerControls">
+  <documentManagement>
+    <Security xmlns="1ceb290c-0c0f-4d75-9d55-bf954c0fe360">Internal FR</Security>
+    <IconOverlay xmlns="http://schemas.microsoft.com/sharepoint/v4" xsi:nil="true"/>
+    <Readers xmlns="1ceb290c-0c0f-4d75-9d55-bf954c0fe360">
+      <UserInfo>
+        <DisplayName/>
+        <AccountId xsi:nil="true"/>
+        <AccountType/>
+      </UserInfo>
+    </Readers>
+    <Section xmlns="1ceb290c-0c0f-4d75-9d55-bf954c0fe360">Consumer Finance</Section>
+    <Authors xmlns="1ceb290c-0c0f-4d75-9d55-bf954c0fe360">
+      <UserInfo>
+        <DisplayName>Brian Seok</DisplayName>
+        <AccountId>74</AccountId>
+        <AccountType/>
+      </UserInfo>
+      <UserInfo>
+        <DisplayName>Daniel Nikolic</DisplayName>
+        <AccountId>377</AccountId>
+        <AccountType/>
+      </UserInfo>
+      <UserInfo>
+        <DisplayName>Thomas Allard</DisplayName>
+        <AccountId>341</AccountId>
+        <AccountType/>
+      </UserInfo>
+      <UserInfo>
+        <DisplayName>Shifrah Aron-Dine</DisplayName>
+        <AccountId>379</AccountId>
+        <AccountType/>
+      </UserInfo>
+      <UserInfo>
+        <DisplayName>Jeffrey Naber</DisplayName>
+        <AccountId>61</AccountId>
+        <AccountType/>
+      </UserInfo>
+      <UserInfo>
+        <DisplayName>Kathryn Holston</DisplayName>
+        <AccountId>381</AccountId>
+        <AccountType/>
+      </UserInfo>
+      <UserInfo>
+        <DisplayName>Melanie Josselyn</DisplayName>
+        <AccountId>288</AccountId>
+        <AccountType/>
+      </UserInfo>
+      <UserInfo>
+        <DisplayName>Erik Larsson</DisplayName>
+        <AccountId>382</AccountId>
+        <AccountType/>
+      </UserInfo>
+      <UserInfo>
+        <DisplayName>Mailam Huynh</DisplayName>
+        <AccountId>67</AccountId>
+        <AccountType/>
+      </UserInfo>
+      <UserInfo>
+        <DisplayName>Nicholas Becker</DisplayName>
+        <AccountId>383</AccountId>
+        <AccountType/>
+      </UserInfo>
+      <UserInfo>
+        <DisplayName>Thomas May</DisplayName>
+        <AccountId>384</AccountId>
+        <AccountType/>
+      </UserInfo>
+      <UserInfo>
+        <DisplayName>William Hayes</DisplayName>
+        <AccountId>385</AccountId>
+        <AccountType/>
+      </UserInfo>
+      <UserInfo>
+        <DisplayName>Katherine Richard</DisplayName>
+        <AccountId>386</AccountId>
+        <AccountType/>
+      </UserInfo>
+      <UserInfo>
+        <DisplayName>Daniel Schwindt</DisplayName>
+        <AccountId>387</AccountId>
+        <AccountType/>
+      </UserInfo>
+      <UserInfo>
+        <DisplayName>Simeon Markind</DisplayName>
+        <AccountId>378</AccountId>
+        <AccountType/>
+      </UserInfo>
+      <UserInfo>
+        <DisplayName>Damian Thomas</DisplayName>
+        <AccountId>370</AccountId>
+        <AccountType/>
+      </UserInfo>
+      <UserInfo>
+        <DisplayName>William Ampeh</DisplayName>
+        <AccountId>376</AccountId>
+        <AccountType/>
+      </UserInfo>
+      <UserInfo>
+        <DisplayName>Andrew Cohen</DisplayName>
+        <AccountId>159</AccountId>
+        <AccountType/>
+      </UserInfo>
+    </Authors>
+    <PublishingExpirationDate xmlns="http://schemas.microsoft.com/sharepoint/v3" xsi:nil="true"/>
+    <Division xmlns="1ceb290c-0c0f-4d75-9d55-bf954c0fe360">Research &amp; Statistics</Division>
+    <PublishingStartDate xmlns="http://schemas.microsoft.com/sharepoint/v3" xsi:nil="true"/>
+    <Project_x0020_Owner xmlns="1ceb290c-0c0f-4d75-9d55-bf954c0fe360">
+      <UserInfo>
+        <DisplayName/>
+        <AccountId>375</AccountId>
+        <AccountType/>
+      </UserInfo>
+    </Project_x0020_Owner>
+    <_dlc_DocId xmlns="1ceb290c-0c0f-4d75-9d55-bf954c0fe360">COLLAB-632341292-1611</_dlc_DocId>
+    <_dlc_DocIdUrl xmlns="1ceb290c-0c0f-4d75-9d55-bf954c0fe360">
+      <Url>https://spweb.frb.gov/sites/collab/_layouts/15/DocIdRedir.aspx?ID=COLLAB-632341292-1611</Url>
+      <Description>COLLAB-632341292-1611</Description>
+    </_dlc_DocIdUrl>
+  </documentManagement>
+</p:properties>
+</file>
+
+<file path=customXml/itemProps1.xml><?xml version="1.0" encoding="utf-8"?>
+<ds:datastoreItem xmlns:ds="http://schemas.openxmlformats.org/officeDocument/2006/customXml" ds:itemID="{9C31B86F-806A-4187-B601-157E67A140CB}"/>
+</file>
+
+<file path=customXml/itemProps2.xml><?xml version="1.0" encoding="utf-8"?>
+<ds:datastoreItem xmlns:ds="http://schemas.openxmlformats.org/officeDocument/2006/customXml" ds:itemID="{1784ED79-8BA6-446F-9EB7-34069BD96365}"/>
+</file>
+
+<file path=customXml/itemProps3.xml><?xml version="1.0" encoding="utf-8"?>
+<ds:datastoreItem xmlns:ds="http://schemas.openxmlformats.org/officeDocument/2006/customXml" ds:itemID="{C1519C21-CCAF-435F-A9CE-49C37C4A0D21}"/>
+</file>
+
+<file path=customXml/itemProps4.xml><?xml version="1.0" encoding="utf-8"?>
+<ds:datastoreItem xmlns:ds="http://schemas.openxmlformats.org/officeDocument/2006/customXml" ds:itemID="{C502F58E-0742-4428-8E21-87B27CC62FEA}"/>
 </file>
</xml_diff>